<commit_message>
[lpc51u68][ezh][keyscan]v1.4 0.update four channels toggle using sigle instruction 2.delete one channel toggle folder 3.update the slid about comparison
</commit_message>
<xml_diff>
--- a/ezh_for_key_scan_john.pptx
+++ b/ezh_for_key_scan_john.pptx
@@ -261,7 +261,7 @@
                 </a:solidFill>
               </a:rPr>
               <a:pPr algn="l"/>
-              <a:t>3/15/2019 2:15:45 PM</a:t>
+              <a:t>3/15/2019 4:49:07 PM</a:t>
             </a:fld>
             <a:endParaRPr lang="en-US" sz="900" dirty="0">
               <a:solidFill>
@@ -1522,7 +1522,7 @@
                 </a:solidFill>
               </a:rPr>
               <a:pPr algn="l"/>
-              <a:t>3/15/2019 2:15:38 PM</a:t>
+              <a:t>3/15/2019 4:48:30 PM</a:t>
             </a:fld>
             <a:endParaRPr lang="en-US" sz="900" dirty="0">
               <a:solidFill>
@@ -42884,7 +42884,7 @@
           <p:nvPr>
             <p:extLst>
               <p:ext uri="{D42A27DB-BD31-4B8C-83A1-F6EECF244321}">
-                <p14:modId xmlns:p14="http://schemas.microsoft.com/office/powerpoint/2010/main" val="847280630"/>
+                <p14:modId xmlns:p14="http://schemas.microsoft.com/office/powerpoint/2010/main" val="2185805240"/>
               </p:ext>
             </p:extLst>
           </p:nvPr>
@@ -42924,19 +42924,7 @@
                       <a:pPr algn="ctr"/>
                       <a:r>
                         <a:rPr lang="en-US" altLang="zh-CN" sz="2000" dirty="0"/>
-                        <a:t>Key scan cycle using EZH (</a:t>
-                      </a:r>
-                      <a:r>
-                        <a:rPr lang="en-US" altLang="zh-CN" sz="2000" dirty="0">
-                          <a:solidFill>
-                            <a:schemeClr val="bg1"/>
-                          </a:solidFill>
-                        </a:rPr>
-                        <a:t>490ns</a:t>
-                      </a:r>
-                      <a:r>
-                        <a:rPr lang="en-US" altLang="zh-CN" sz="2000" dirty="0"/>
-                        <a:t>)</a:t>
+                        <a:t>Key scan cycle using EZH</a:t>
                       </a:r>
                       <a:endParaRPr lang="zh-CN" altLang="en-US" sz="2000" dirty="0"/>
                     </a:p>
@@ -42951,19 +42939,7 @@
                       <a:pPr algn="ctr"/>
                       <a:r>
                         <a:rPr lang="en-US" altLang="zh-CN" sz="2000" b="1" dirty="0"/>
-                        <a:t>Key scan cycle using CM0+ (</a:t>
-                      </a:r>
-                      <a:r>
-                        <a:rPr lang="en-US" altLang="zh-CN" sz="2000" b="1" dirty="0">
-                          <a:solidFill>
-                            <a:schemeClr val="bg1"/>
-                          </a:solidFill>
-                        </a:rPr>
-                        <a:t>5770ns</a:t>
-                      </a:r>
-                      <a:r>
-                        <a:rPr lang="en-US" altLang="zh-CN" sz="2000" b="1" dirty="0"/>
-                        <a:t>)</a:t>
+                        <a:t>Key scan cycle using CM0+ </a:t>
                       </a:r>
                     </a:p>
                   </a:txBody>
@@ -43562,7 +43538,7 @@
           <a:p>
             <a:r>
               <a:rPr lang="en-US" altLang="zh-CN" dirty="0"/>
-              <a:t>Four channel IO toggle cycle compare @96MHz</a:t>
+              <a:t>Four channels IO toggle cycle compare @96MHz</a:t>
             </a:r>
             <a:endParaRPr lang="zh-CN" altLang="en-US" dirty="0"/>
           </a:p>
@@ -43602,7 +43578,7 @@
                   <a:srgbClr val="FF0000"/>
                 </a:solidFill>
               </a:rPr>
-              <a:t>Four channel IO toggle cycle is 82.6ns using EZH, while it is 1770.6ns using CM0+ @96MHz</a:t>
+              <a:t>Four channel IO toggle cycle is 20.6ns using EZH, while it is 165.4ns using CM0+ @96MHz</a:t>
             </a:r>
             <a:endParaRPr lang="zh-CN" altLang="en-US" dirty="0">
               <a:solidFill>
@@ -43678,10 +43654,10 @@
       </p:sp>
       <p:pic>
         <p:nvPicPr>
-          <p:cNvPr id="9" name="Picture 8">
+          <p:cNvPr id="8" name="Picture 7">
             <a:extLst>
               <a:ext uri="{FF2B5EF4-FFF2-40B4-BE49-F238E27FC236}">
-                <a16:creationId xmlns:a16="http://schemas.microsoft.com/office/drawing/2014/main" id="{AD071798-99D4-4FC7-A561-10168906E24D}"/>
+                <a16:creationId xmlns:a16="http://schemas.microsoft.com/office/drawing/2014/main" id="{DA59D90A-4AAC-463E-A7C7-9510FBE83895}"/>
               </a:ext>
             </a:extLst>
           </p:cNvPr>
@@ -43704,8 +43680,44 @@
         </p:blipFill>
         <p:spPr>
           <a:xfrm>
-            <a:off x="567586" y="1862926"/>
-            <a:ext cx="5296238" cy="2581916"/>
+            <a:off x="495576" y="1862926"/>
+            <a:ext cx="5305858" cy="2586606"/>
+          </a:xfrm>
+          <a:prstGeom prst="rect">
+            <a:avLst/>
+          </a:prstGeom>
+        </p:spPr>
+      </p:pic>
+      <p:pic>
+        <p:nvPicPr>
+          <p:cNvPr id="14" name="Picture 13">
+            <a:extLst>
+              <a:ext uri="{FF2B5EF4-FFF2-40B4-BE49-F238E27FC236}">
+                <a16:creationId xmlns:a16="http://schemas.microsoft.com/office/drawing/2014/main" id="{59E88A11-4E34-43AB-9C1B-EB2FD693CE65}"/>
+              </a:ext>
+            </a:extLst>
+          </p:cNvPr>
+          <p:cNvPicPr>
+            <a:picLocks noChangeAspect="1"/>
+          </p:cNvPicPr>
+          <p:nvPr/>
+        </p:nvPicPr>
+        <p:blipFill>
+          <a:blip r:embed="rId3">
+            <a:extLst>
+              <a:ext uri="{28A0092B-C50C-407E-A947-70E740481C1C}">
+                <a14:useLocalDpi xmlns:a14="http://schemas.microsoft.com/office/drawing/2010/main" val="0"/>
+              </a:ext>
+            </a:extLst>
+          </a:blip>
+          <a:stretch>
+            <a:fillRect/>
+          </a:stretch>
+        </p:blipFill>
+        <p:spPr>
+          <a:xfrm>
+            <a:off x="5975856" y="1862925"/>
+            <a:ext cx="5305861" cy="2586607"/>
           </a:xfrm>
           <a:prstGeom prst="rect">
             <a:avLst/>
@@ -43728,8 +43740,8 @@
         </p:nvCxnSpPr>
         <p:spPr>
           <a:xfrm>
-            <a:off x="1260021" y="2404506"/>
-            <a:ext cx="2071008" cy="0"/>
+            <a:off x="1381125" y="2382622"/>
+            <a:ext cx="1019175" cy="0"/>
           </a:xfrm>
           <a:prstGeom prst="straightConnector1">
             <a:avLst/>
@@ -43771,7 +43783,7 @@
         </p:nvSpPr>
         <p:spPr>
           <a:xfrm>
-            <a:off x="1900835" y="2379144"/>
+            <a:off x="1433512" y="2404506"/>
             <a:ext cx="914400" cy="212413"/>
           </a:xfrm>
           <a:prstGeom prst="rect">
@@ -43801,42 +43813,6 @@
           </a:p>
         </p:txBody>
       </p:sp>
-      <p:pic>
-        <p:nvPicPr>
-          <p:cNvPr id="16" name="Picture 15">
-            <a:extLst>
-              <a:ext uri="{FF2B5EF4-FFF2-40B4-BE49-F238E27FC236}">
-                <a16:creationId xmlns:a16="http://schemas.microsoft.com/office/drawing/2014/main" id="{0919A01F-C168-4F31-9902-F62E1F0CE320}"/>
-              </a:ext>
-            </a:extLst>
-          </p:cNvPr>
-          <p:cNvPicPr>
-            <a:picLocks noChangeAspect="1"/>
-          </p:cNvPicPr>
-          <p:nvPr/>
-        </p:nvPicPr>
-        <p:blipFill>
-          <a:blip r:embed="rId3">
-            <a:extLst>
-              <a:ext uri="{28A0092B-C50C-407E-A947-70E740481C1C}">
-                <a14:useLocalDpi xmlns:a14="http://schemas.microsoft.com/office/drawing/2010/main" val="0"/>
-              </a:ext>
-            </a:extLst>
-          </a:blip>
-          <a:stretch>
-            <a:fillRect/>
-          </a:stretch>
-        </p:blipFill>
-        <p:spPr>
-          <a:xfrm>
-            <a:off x="5955191" y="1862926"/>
-            <a:ext cx="5296238" cy="2581916"/>
-          </a:xfrm>
-          <a:prstGeom prst="rect">
-            <a:avLst/>
-          </a:prstGeom>
-        </p:spPr>
-      </p:pic>
       <p:cxnSp>
         <p:nvCxnSpPr>
           <p:cNvPr id="11" name="Straight Arrow Connector 10">
@@ -43852,9 +43828,9 @@
           <p:nvPr/>
         </p:nvCxnSpPr>
         <p:spPr>
-          <a:xfrm flipV="1">
-            <a:off x="6477494" y="2404506"/>
-            <a:ext cx="2157173" cy="12370"/>
+          <a:xfrm>
+            <a:off x="6645729" y="2404506"/>
+            <a:ext cx="2041071" cy="0"/>
           </a:xfrm>
           <a:prstGeom prst="straightConnector1">
             <a:avLst/>
@@ -43974,7 +43950,7 @@
           <p:nvPr>
             <p:extLst>
               <p:ext uri="{D42A27DB-BD31-4B8C-83A1-F6EECF244321}">
-                <p14:modId xmlns:p14="http://schemas.microsoft.com/office/powerpoint/2010/main" val="1943175410"/>
+                <p14:modId xmlns:p14="http://schemas.microsoft.com/office/powerpoint/2010/main" val="2428289375"/>
               </p:ext>
             </p:extLst>
           </p:nvPr>
@@ -44095,7 +44071,7 @@
           <a:p>
             <a:r>
               <a:rPr lang="en-US" altLang="zh-CN" dirty="0"/>
-              <a:t>Four channel IO toggle cycle compare @150MHz</a:t>
+              <a:t>Four channels IO toggle cycle compare @150MHz</a:t>
             </a:r>
             <a:endParaRPr lang="zh-CN" altLang="en-US" dirty="0"/>
           </a:p>
@@ -44135,7 +44111,7 @@
                   <a:srgbClr val="FF0000"/>
                 </a:solidFill>
               </a:rPr>
-              <a:t>Four channel IO toggle cycle is 53ns using EZH, while it is 1130.6ns using CM0+ @150MHz</a:t>
+              <a:t>Four channel IO toggle cycle is 13.8ns using EZH, while it is 107ns using CM0+ @150MHz</a:t>
             </a:r>
             <a:endParaRPr lang="zh-CN" altLang="en-US" dirty="0">
               <a:solidFill>
@@ -44211,10 +44187,10 @@
       </p:sp>
       <p:pic>
         <p:nvPicPr>
-          <p:cNvPr id="15" name="Picture 14">
+          <p:cNvPr id="8" name="Picture 7">
             <a:extLst>
               <a:ext uri="{FF2B5EF4-FFF2-40B4-BE49-F238E27FC236}">
-                <a16:creationId xmlns:a16="http://schemas.microsoft.com/office/drawing/2014/main" id="{5257AE61-8944-4F00-889D-F95A41A908C2}"/>
+                <a16:creationId xmlns:a16="http://schemas.microsoft.com/office/drawing/2014/main" id="{749EAB74-E0FC-4EA0-8159-7CBE1A6FA9AE}"/>
               </a:ext>
             </a:extLst>
           </p:cNvPr>
@@ -44237,8 +44213,44 @@
         </p:blipFill>
         <p:spPr>
           <a:xfrm>
-            <a:off x="5931268" y="1862925"/>
-            <a:ext cx="5322613" cy="2594774"/>
+            <a:off x="476596" y="1785684"/>
+            <a:ext cx="5397321" cy="2631194"/>
+          </a:xfrm>
+          <a:prstGeom prst="rect">
+            <a:avLst/>
+          </a:prstGeom>
+        </p:spPr>
+      </p:pic>
+      <p:pic>
+        <p:nvPicPr>
+          <p:cNvPr id="10" name="Picture 9">
+            <a:extLst>
+              <a:ext uri="{FF2B5EF4-FFF2-40B4-BE49-F238E27FC236}">
+                <a16:creationId xmlns:a16="http://schemas.microsoft.com/office/drawing/2014/main" id="{B35ED08E-7D60-4AF7-B61C-4CB586E6F0E4}"/>
+              </a:ext>
+            </a:extLst>
+          </p:cNvPr>
+          <p:cNvPicPr>
+            <a:picLocks noChangeAspect="1"/>
+          </p:cNvPicPr>
+          <p:nvPr/>
+        </p:nvPicPr>
+        <p:blipFill>
+          <a:blip r:embed="rId3">
+            <a:extLst>
+              <a:ext uri="{28A0092B-C50C-407E-A947-70E740481C1C}">
+                <a14:useLocalDpi xmlns:a14="http://schemas.microsoft.com/office/drawing/2010/main" val="0"/>
+              </a:ext>
+            </a:extLst>
+          </a:blip>
+          <a:stretch>
+            <a:fillRect/>
+          </a:stretch>
+        </p:blipFill>
+        <p:spPr>
+          <a:xfrm>
+            <a:off x="5962738" y="1785684"/>
+            <a:ext cx="5397324" cy="2631195"/>
           </a:xfrm>
           <a:prstGeom prst="rect">
             <a:avLst/>
@@ -44261,8 +44273,8 @@
         </p:nvCxnSpPr>
         <p:spPr>
           <a:xfrm flipV="1">
-            <a:off x="7209064" y="2414698"/>
-            <a:ext cx="1452336" cy="1"/>
+            <a:off x="7356021" y="2414697"/>
+            <a:ext cx="1343479" cy="1"/>
           </a:xfrm>
           <a:prstGeom prst="straightConnector1">
             <a:avLst/>
@@ -44334,42 +44346,6 @@
           </a:p>
         </p:txBody>
       </p:sp>
-      <p:pic>
-        <p:nvPicPr>
-          <p:cNvPr id="17" name="Picture 16">
-            <a:extLst>
-              <a:ext uri="{FF2B5EF4-FFF2-40B4-BE49-F238E27FC236}">
-                <a16:creationId xmlns:a16="http://schemas.microsoft.com/office/drawing/2014/main" id="{E7975B5C-4C8F-4A60-A313-6547B5A94F7F}"/>
-              </a:ext>
-            </a:extLst>
-          </p:cNvPr>
-          <p:cNvPicPr>
-            <a:picLocks noChangeAspect="1"/>
-          </p:cNvPicPr>
-          <p:nvPr/>
-        </p:nvPicPr>
-        <p:blipFill>
-          <a:blip r:embed="rId3">
-            <a:extLst>
-              <a:ext uri="{28A0092B-C50C-407E-A947-70E740481C1C}">
-                <a14:useLocalDpi xmlns:a14="http://schemas.microsoft.com/office/drawing/2010/main" val="0"/>
-              </a:ext>
-            </a:extLst>
-          </a:blip>
-          <a:stretch>
-            <a:fillRect/>
-          </a:stretch>
-        </p:blipFill>
-        <p:spPr>
-          <a:xfrm>
-            <a:off x="475861" y="1862924"/>
-            <a:ext cx="5322611" cy="2594773"/>
-          </a:xfrm>
-          <a:prstGeom prst="rect">
-            <a:avLst/>
-          </a:prstGeom>
-        </p:spPr>
-      </p:pic>
       <p:cxnSp>
         <p:nvCxnSpPr>
           <p:cNvPr id="7" name="Straight Arrow Connector 6">
@@ -44385,9 +44361,9 @@
           <p:nvPr/>
         </p:nvCxnSpPr>
         <p:spPr>
-          <a:xfrm flipV="1">
-            <a:off x="2514600" y="2414697"/>
-            <a:ext cx="665480" cy="1206"/>
+          <a:xfrm>
+            <a:off x="1724660" y="2308504"/>
+            <a:ext cx="713740" cy="0"/>
           </a:xfrm>
           <a:prstGeom prst="straightConnector1">
             <a:avLst/>
@@ -44429,7 +44405,7 @@
         </p:nvSpPr>
         <p:spPr>
           <a:xfrm>
-            <a:off x="2371725" y="2414698"/>
+            <a:off x="1624330" y="2299187"/>
             <a:ext cx="914400" cy="212413"/>
           </a:xfrm>
           <a:prstGeom prst="rect">
@@ -46087,15 +46063,12 @@
 </file>
 
 <file path=customXml/item1.xml><?xml version="1.0" encoding="utf-8"?>
-<p:properties xmlns:p="http://schemas.microsoft.com/office/2006/metadata/properties" xmlns:xsi="http://www.w3.org/2001/XMLSchema-instance" xmlns:pc="http://schemas.microsoft.com/office/infopath/2007/PartnerControls">
-  <documentManagement>
-    <_dlc_DocId xmlns="8478c352-1115-4aa7-8db5-10d3b7bf3c89">XUZZM43XYQ55-362031324-51</_dlc_DocId>
-    <_dlc_DocIdUrl xmlns="8478c352-1115-4aa7-8db5-10d3b7bf3c89">
-      <Url>https://freescale.sharepoint.com/sites/itcms/portalapplications/_layouts/15/DocIdRedir.aspx?ID=XUZZM43XYQ55-362031324-51</Url>
-      <Description>XUZZM43XYQ55-362031324-51</Description>
-    </_dlc_DocIdUrl>
-  </documentManagement>
-</p:properties>
+<?mso-contentType ?>
+<FormTemplates xmlns="http://schemas.microsoft.com/sharepoint/v3/contenttype/forms">
+  <Display>DocumentLibraryForm</Display>
+  <Edit>DocumentLibraryForm</Edit>
+  <New>DocumentLibraryForm</New>
+</FormTemplates>
 </file>
 
 <file path=customXml/item2.xml><?xml version="1.0" encoding="utf-8"?>
@@ -46149,12 +46122,15 @@
 </file>
 
 <file path=customXml/item3.xml><?xml version="1.0" encoding="utf-8"?>
-<?mso-contentType ?>
-<FormTemplates xmlns="http://schemas.microsoft.com/sharepoint/v3/contenttype/forms">
-  <Display>DocumentLibraryForm</Display>
-  <Edit>DocumentLibraryForm</Edit>
-  <New>DocumentLibraryForm</New>
-</FormTemplates>
+<p:properties xmlns:p="http://schemas.microsoft.com/office/2006/metadata/properties" xmlns:xsi="http://www.w3.org/2001/XMLSchema-instance" xmlns:pc="http://schemas.microsoft.com/office/infopath/2007/PartnerControls">
+  <documentManagement>
+    <_dlc_DocId xmlns="8478c352-1115-4aa7-8db5-10d3b7bf3c89">XUZZM43XYQ55-362031324-51</_dlc_DocId>
+    <_dlc_DocIdUrl xmlns="8478c352-1115-4aa7-8db5-10d3b7bf3c89">
+      <Url>https://freescale.sharepoint.com/sites/itcms/portalapplications/_layouts/15/DocIdRedir.aspx?ID=XUZZM43XYQ55-362031324-51</Url>
+      <Description>XUZZM43XYQ55-362031324-51</Description>
+    </_dlc_DocIdUrl>
+  </documentManagement>
+</p:properties>
 </file>
 
 <file path=customXml/item4.xml><?xml version="1.0" encoding="utf-8"?>
@@ -46336,11 +46312,9 @@
 </file>
 
 <file path=customXml/itemProps1.xml><?xml version="1.0" encoding="utf-8"?>
-<ds:datastoreItem xmlns:ds="http://schemas.openxmlformats.org/officeDocument/2006/customXml" ds:itemID="{71609B37-6336-43C6-BBCC-F6A021A4C3B4}">
+<ds:datastoreItem xmlns:ds="http://schemas.openxmlformats.org/officeDocument/2006/customXml" ds:itemID="{2A241B79-FDAA-4E8E-B0C2-DC1FDADCA65B}">
   <ds:schemaRefs>
-    <ds:schemaRef ds:uri="http://schemas.microsoft.com/office/2006/metadata/properties"/>
-    <ds:schemaRef ds:uri="http://schemas.microsoft.com/office/infopath/2007/PartnerControls"/>
-    <ds:schemaRef ds:uri="8478c352-1115-4aa7-8db5-10d3b7bf3c89"/>
+    <ds:schemaRef ds:uri="http://schemas.microsoft.com/sharepoint/v3/contenttype/forms"/>
   </ds:schemaRefs>
 </ds:datastoreItem>
 </file>
@@ -46354,9 +46328,11 @@
 </file>
 
 <file path=customXml/itemProps3.xml><?xml version="1.0" encoding="utf-8"?>
-<ds:datastoreItem xmlns:ds="http://schemas.openxmlformats.org/officeDocument/2006/customXml" ds:itemID="{2A241B79-FDAA-4E8E-B0C2-DC1FDADCA65B}">
+<ds:datastoreItem xmlns:ds="http://schemas.openxmlformats.org/officeDocument/2006/customXml" ds:itemID="{71609B37-6336-43C6-BBCC-F6A021A4C3B4}">
   <ds:schemaRefs>
-    <ds:schemaRef ds:uri="http://schemas.microsoft.com/sharepoint/v3/contenttype/forms"/>
+    <ds:schemaRef ds:uri="http://schemas.microsoft.com/office/2006/metadata/properties"/>
+    <ds:schemaRef ds:uri="http://schemas.microsoft.com/office/infopath/2007/PartnerControls"/>
+    <ds:schemaRef ds:uri="8478c352-1115-4aa7-8db5-10d3b7bf3c89"/>
   </ds:schemaRefs>
 </ds:datastoreItem>
 </file>

</xml_diff>